<commit_message>
Update project poster & statistics page
</commit_message>
<xml_diff>
--- a/Documents/Project Poster.pptx
+++ b/Documents/Project Poster.pptx
@@ -4540,7 +4540,7 @@
                 <a:ea typeface="Calibri" panose="020F0502020204030204" pitchFamily="34" charset="0"/>
                 <a:cs typeface="Arial" panose="020B0604020202020204" pitchFamily="34" charset="0"/>
               </a:rPr>
-              <a:t>This project is a software engineering project which created as part of the Ben Gurion University (BGU) software engineering program.</a:t>
+              <a:t>MolOptimizer is a software engineering project which created as part of the Ben Gurion University (BGU) software engineering program.</a:t>
             </a:r>
           </a:p>
           <a:p>
@@ -4892,7 +4892,7 @@
                 <a:ea typeface="Calibri" panose="020F0502020204030204" pitchFamily="34" charset="0"/>
                 <a:cs typeface="Arial" panose="020B0604020202020204" pitchFamily="34" charset="0"/>
               </a:rPr>
-              <a:t>At the beginning, MolOpt was a basic flask-based web package which can be used for Alignment of large ligand datasets, extracting large volume of Chemical Descriptors and training Machine Learning models to predict binding scores, which only ran locally on the labs computers.</a:t>
+              <a:t>At the beginning, MolOpt was a very basic flask-based web package which can be used for Alignment of large ligand datasets, extracting large volume of Chemical Descriptors and training Machine Learning models to predict binding scores, which only ran locally on the labs computers.</a:t>
             </a:r>
           </a:p>
           <a:p>
@@ -4954,23 +4954,7 @@
                 <a:ea typeface="Calibri" panose="020F0502020204030204" pitchFamily="34" charset="0"/>
                 <a:cs typeface="Arial" panose="020B0604020202020204" pitchFamily="34" charset="0"/>
               </a:rPr>
-              <a:t>Keeping &amp; Optimizing the Alignment</a:t>
-            </a:r>
-            <a:r>
-              <a:rPr lang="en-US" sz="3600">
-                <a:latin typeface="Arial" panose="020B0604020202020204" pitchFamily="34" charset="0"/>
-                <a:ea typeface="Calibri" panose="020F0502020204030204" pitchFamily="34" charset="0"/>
-                <a:cs typeface="Arial" panose="020B0604020202020204" pitchFamily="34" charset="0"/>
-              </a:rPr>
-              <a:t>, Feature </a:t>
-            </a:r>
-            <a:r>
-              <a:rPr lang="en-US" sz="3600" dirty="0">
-                <a:latin typeface="Arial" panose="020B0604020202020204" pitchFamily="34" charset="0"/>
-                <a:ea typeface="Calibri" panose="020F0502020204030204" pitchFamily="34" charset="0"/>
-                <a:cs typeface="Arial" panose="020B0604020202020204" pitchFamily="34" charset="0"/>
-              </a:rPr>
-              <a:t>Extractions &amp; ML Algorithm Runnings.</a:t>
+              <a:t>Keeping &amp; Optimizing the Alignment, Feature Extractions &amp; ML Algorithm Runnings.</a:t>
             </a:r>
           </a:p>
           <a:p>
@@ -5016,7 +5000,7 @@
                 <a:ea typeface="Calibri" panose="020F0502020204030204" pitchFamily="34" charset="0"/>
                 <a:cs typeface="Arial" panose="020B0604020202020204" pitchFamily="34" charset="0"/>
               </a:rPr>
-              <a:t>Updating the old flask application to a modern and new Material UI application.</a:t>
+              <a:t>Updating the old flask application to a modern and new Material UI &amp; React JS and Django python application.</a:t>
             </a:r>
           </a:p>
           <a:p>
@@ -5984,53 +5968,6 @@
       </p:pic>
       <p:pic>
         <p:nvPicPr>
-          <p:cNvPr id="1048" name="Picture 24" descr="Google Analytics Logo and symbol, meaning, history, PNG, brand">
-            <a:extLst>
-              <a:ext uri="{FF2B5EF4-FFF2-40B4-BE49-F238E27FC236}">
-                <a16:creationId xmlns:a16="http://schemas.microsoft.com/office/drawing/2014/main" id="{3AE44982-3101-3BB5-878A-0B4963688662}"/>
-              </a:ext>
-            </a:extLst>
-          </p:cNvPr>
-          <p:cNvPicPr>
-            <a:picLocks noChangeAspect="1" noChangeArrowheads="1"/>
-          </p:cNvPicPr>
-          <p:nvPr/>
-        </p:nvPicPr>
-        <p:blipFill>
-          <a:blip r:embed="rId11" cstate="print">
-            <a:extLst>
-              <a:ext uri="{28A0092B-C50C-407E-A947-70E740481C1C}">
-                <a14:useLocalDpi xmlns:a14="http://schemas.microsoft.com/office/drawing/2010/main" val="0"/>
-              </a:ext>
-            </a:extLst>
-          </a:blip>
-          <a:srcRect/>
-          <a:stretch>
-            <a:fillRect/>
-          </a:stretch>
-        </p:blipFill>
-        <p:spPr bwMode="auto">
-          <a:xfrm>
-            <a:off x="10521318" y="40974489"/>
-            <a:ext cx="4914330" cy="2764311"/>
-          </a:xfrm>
-          <a:prstGeom prst="rect">
-            <a:avLst/>
-          </a:prstGeom>
-          <a:noFill/>
-          <a:extLst>
-            <a:ext uri="{909E8E84-426E-40DD-AFC4-6F175D3DCCD1}">
-              <a14:hiddenFill xmlns:a14="http://schemas.microsoft.com/office/drawing/2010/main">
-                <a:solidFill>
-                  <a:srgbClr val="FFFFFF"/>
-                </a:solidFill>
-              </a14:hiddenFill>
-            </a:ext>
-          </a:extLst>
-        </p:spPr>
-      </p:pic>
-      <p:pic>
-        <p:nvPicPr>
           <p:cNvPr id="44" name="Picture 43" descr="A green and white sign&#10;&#10;Description automatically generated with low confidence">
             <a:extLst>
               <a:ext uri="{FF2B5EF4-FFF2-40B4-BE49-F238E27FC236}">
@@ -6044,7 +5981,7 @@
           <p:nvPr/>
         </p:nvPicPr>
         <p:blipFill>
-          <a:blip r:embed="rId12">
+          <a:blip r:embed="rId11">
             <a:extLst>
               <a:ext uri="{28A0092B-C50C-407E-A947-70E740481C1C}">
                 <a14:useLocalDpi xmlns:a14="http://schemas.microsoft.com/office/drawing/2010/main" val="0"/>
@@ -6080,15 +6017,15 @@
           <p:nvPr/>
         </p:nvPicPr>
         <p:blipFill>
-          <a:blip r:embed="rId13"/>
+          <a:blip r:embed="rId12"/>
           <a:stretch>
             <a:fillRect/>
           </a:stretch>
         </p:blipFill>
         <p:spPr>
           <a:xfrm>
-            <a:off x="17548690" y="7537645"/>
-            <a:ext cx="14127042" cy="6586309"/>
+            <a:off x="17650120" y="7732997"/>
+            <a:ext cx="14025611" cy="6539020"/>
           </a:xfrm>
           <a:prstGeom prst="rect">
             <a:avLst/>
@@ -6110,75 +6047,15 @@
           <p:nvPr/>
         </p:nvPicPr>
         <p:blipFill>
-          <a:blip r:embed="rId14"/>
+          <a:blip r:embed="rId13"/>
           <a:stretch>
             <a:fillRect/>
           </a:stretch>
         </p:blipFill>
         <p:spPr>
           <a:xfrm>
-            <a:off x="17596072" y="14422598"/>
+            <a:off x="17596072" y="15058469"/>
             <a:ext cx="14079660" cy="4813297"/>
-          </a:xfrm>
-          <a:prstGeom prst="rect">
-            <a:avLst/>
-          </a:prstGeom>
-        </p:spPr>
-      </p:pic>
-      <p:pic>
-        <p:nvPicPr>
-          <p:cNvPr id="23" name="Picture 22">
-            <a:extLst>
-              <a:ext uri="{FF2B5EF4-FFF2-40B4-BE49-F238E27FC236}">
-                <a16:creationId xmlns:a16="http://schemas.microsoft.com/office/drawing/2014/main" id="{1E020814-F409-C92E-9CA2-E67957B7D7CA}"/>
-              </a:ext>
-            </a:extLst>
-          </p:cNvPr>
-          <p:cNvPicPr>
-            <a:picLocks noChangeAspect="1"/>
-          </p:cNvPicPr>
-          <p:nvPr/>
-        </p:nvPicPr>
-        <p:blipFill>
-          <a:blip r:embed="rId15"/>
-          <a:stretch>
-            <a:fillRect/>
-          </a:stretch>
-        </p:blipFill>
-        <p:spPr>
-          <a:xfrm>
-            <a:off x="17548690" y="19534539"/>
-            <a:ext cx="14127042" cy="5682123"/>
-          </a:xfrm>
-          <a:prstGeom prst="rect">
-            <a:avLst/>
-          </a:prstGeom>
-        </p:spPr>
-      </p:pic>
-      <p:pic>
-        <p:nvPicPr>
-          <p:cNvPr id="26" name="Picture 25">
-            <a:extLst>
-              <a:ext uri="{FF2B5EF4-FFF2-40B4-BE49-F238E27FC236}">
-                <a16:creationId xmlns:a16="http://schemas.microsoft.com/office/drawing/2014/main" id="{B9689910-E398-4985-DB86-C44D1DC527ED}"/>
-              </a:ext>
-            </a:extLst>
-          </p:cNvPr>
-          <p:cNvPicPr>
-            <a:picLocks noChangeAspect="1"/>
-          </p:cNvPicPr>
-          <p:nvPr/>
-        </p:nvPicPr>
-        <p:blipFill>
-          <a:blip r:embed="rId16"/>
-          <a:stretch>
-            <a:fillRect/>
-          </a:stretch>
-        </p:blipFill>
-        <p:spPr>
-          <a:xfrm>
-            <a:off x="17596072" y="25513048"/>
-            <a:ext cx="13963219" cy="4662151"/>
           </a:xfrm>
           <a:prstGeom prst="rect">
             <a:avLst/>
@@ -6200,7 +6077,7 @@
           <p:nvPr/>
         </p:nvPicPr>
         <p:blipFill>
-          <a:blip r:embed="rId17">
+          <a:blip r:embed="rId14">
             <a:extLst>
               <a:ext uri="{28A0092B-C50C-407E-A947-70E740481C1C}">
                 <a14:useLocalDpi xmlns:a14="http://schemas.microsoft.com/office/drawing/2010/main" val="0"/>
@@ -6213,8 +6090,8 @@
         </p:blipFill>
         <p:spPr>
           <a:xfrm rot="10800000">
-            <a:off x="15712888" y="34193079"/>
-            <a:ext cx="2937221" cy="5682123"/>
+            <a:off x="16405220" y="39728183"/>
+            <a:ext cx="2045295" cy="3956672"/>
           </a:xfrm>
           <a:prstGeom prst="rect">
             <a:avLst/>
@@ -6236,7 +6113,7 @@
           <p:nvPr/>
         </p:nvPicPr>
         <p:blipFill>
-          <a:blip r:embed="rId18">
+          <a:blip r:embed="rId15">
             <a:extLst>
               <a:ext uri="{28A0092B-C50C-407E-A947-70E740481C1C}">
                 <a14:useLocalDpi xmlns:a14="http://schemas.microsoft.com/office/drawing/2010/main" val="0"/>
@@ -6257,42 +6134,6 @@
           </a:prstGeom>
         </p:spPr>
       </p:pic>
-      <p:sp>
-        <p:nvSpPr>
-          <p:cNvPr id="43" name="TextBox 42">
-            <a:extLst>
-              <a:ext uri="{FF2B5EF4-FFF2-40B4-BE49-F238E27FC236}">
-                <a16:creationId xmlns:a16="http://schemas.microsoft.com/office/drawing/2014/main" id="{214F6B87-2557-009B-BF24-104230C5DB50}"/>
-              </a:ext>
-            </a:extLst>
-          </p:cNvPr>
-          <p:cNvSpPr txBox="1"/>
-          <p:nvPr/>
-        </p:nvSpPr>
-        <p:spPr>
-          <a:xfrm>
-            <a:off x="26856724" y="39389516"/>
-            <a:ext cx="5718776" cy="3631763"/>
-          </a:xfrm>
-          <a:prstGeom prst="rect">
-            <a:avLst/>
-          </a:prstGeom>
-          <a:noFill/>
-        </p:spPr>
-        <p:txBody>
-          <a:bodyPr wrap="square" rtlCol="0">
-            <a:spAutoFit/>
-          </a:bodyPr>
-          <a:lstStyle/>
-          <a:p>
-            <a:r>
-              <a:rPr lang="en-US" sz="11500" b="1" dirty="0"/>
-              <a:t>Project Logo</a:t>
-            </a:r>
-            <a:endParaRPr lang="en-US" b="1" dirty="0"/>
-          </a:p>
-        </p:txBody>
-      </p:sp>
       <p:pic>
         <p:nvPicPr>
           <p:cNvPr id="46" name="Picture 45" descr="Graphical user interface, text, application, chat or text message&#10;&#10;Description automatically generated">
@@ -6308,7 +6149,7 @@
           <p:nvPr/>
         </p:nvPicPr>
         <p:blipFill>
-          <a:blip r:embed="rId19">
+          <a:blip r:embed="rId16">
             <a:extLst>
               <a:ext uri="{28A0092B-C50C-407E-A947-70E740481C1C}">
                 <a14:useLocalDpi xmlns:a14="http://schemas.microsoft.com/office/drawing/2010/main" val="0"/>
@@ -6321,7 +6162,7 @@
         </p:blipFill>
         <p:spPr>
           <a:xfrm>
-            <a:off x="17028709" y="31725037"/>
+            <a:off x="17028709" y="37668637"/>
             <a:ext cx="15309586" cy="3631763"/>
           </a:xfrm>
           <a:prstGeom prst="rect">
@@ -6345,7 +6186,7 @@
         </p:nvSpPr>
         <p:spPr bwMode="auto">
           <a:xfrm>
-            <a:off x="17544679" y="30528387"/>
+            <a:off x="17544679" y="36471987"/>
             <a:ext cx="14277646" cy="914400"/>
           </a:xfrm>
           <a:prstGeom prst="rect">
@@ -6384,10 +6225,57 @@
       </p:sp>
       <p:pic>
         <p:nvPicPr>
-          <p:cNvPr id="51" name="Picture 50" descr="A group of people on a stage&#10;&#10;Description automatically generated with medium confidence">
+          <p:cNvPr id="1028" name="Picture 4" descr="VNC Viewer - Remote Desktop - אפליקציות ב-Google Play">
             <a:extLst>
               <a:ext uri="{FF2B5EF4-FFF2-40B4-BE49-F238E27FC236}">
-                <a16:creationId xmlns:a16="http://schemas.microsoft.com/office/drawing/2014/main" id="{4233D481-59E2-FF1C-7F7E-494C5EC46641}"/>
+                <a16:creationId xmlns:a16="http://schemas.microsoft.com/office/drawing/2014/main" id="{7D2F7BFC-E22A-63B1-0916-497B39692383}"/>
+              </a:ext>
+            </a:extLst>
+          </p:cNvPr>
+          <p:cNvPicPr>
+            <a:picLocks noChangeAspect="1" noChangeArrowheads="1"/>
+          </p:cNvPicPr>
+          <p:nvPr/>
+        </p:nvPicPr>
+        <p:blipFill>
+          <a:blip r:embed="rId17" cstate="print">
+            <a:extLst>
+              <a:ext uri="{28A0092B-C50C-407E-A947-70E740481C1C}">
+                <a14:useLocalDpi xmlns:a14="http://schemas.microsoft.com/office/drawing/2010/main" val="0"/>
+              </a:ext>
+            </a:extLst>
+          </a:blip>
+          <a:srcRect/>
+          <a:stretch>
+            <a:fillRect/>
+          </a:stretch>
+        </p:blipFill>
+        <p:spPr bwMode="auto">
+          <a:xfrm>
+            <a:off x="11613869" y="41373451"/>
+            <a:ext cx="1947648" cy="1947648"/>
+          </a:xfrm>
+          <a:prstGeom prst="rect">
+            <a:avLst/>
+          </a:prstGeom>
+          <a:noFill/>
+          <a:extLst>
+            <a:ext uri="{909E8E84-426E-40DD-AFC4-6F175D3DCCD1}">
+              <a14:hiddenFill xmlns:a14="http://schemas.microsoft.com/office/drawing/2010/main">
+                <a:solidFill>
+                  <a:srgbClr val="FFFFFF"/>
+                </a:solidFill>
+              </a14:hiddenFill>
+            </a:ext>
+          </a:extLst>
+        </p:spPr>
+      </p:pic>
+      <p:pic>
+        <p:nvPicPr>
+          <p:cNvPr id="15" name="Picture 14">
+            <a:extLst>
+              <a:ext uri="{FF2B5EF4-FFF2-40B4-BE49-F238E27FC236}">
+                <a16:creationId xmlns:a16="http://schemas.microsoft.com/office/drawing/2014/main" id="{71B97C51-CFD5-AF23-2CA6-90242B1C1793}"/>
               </a:ext>
             </a:extLst>
           </p:cNvPr>
@@ -6397,7 +6285,97 @@
           <p:nvPr/>
         </p:nvPicPr>
         <p:blipFill>
-          <a:blip r:embed="rId20">
+          <a:blip r:embed="rId18"/>
+          <a:stretch>
+            <a:fillRect/>
+          </a:stretch>
+        </p:blipFill>
+        <p:spPr>
+          <a:xfrm>
+            <a:off x="17650121" y="20610931"/>
+            <a:ext cx="13934570" cy="5282029"/>
+          </a:xfrm>
+          <a:prstGeom prst="rect">
+            <a:avLst/>
+          </a:prstGeom>
+        </p:spPr>
+      </p:pic>
+      <p:pic>
+        <p:nvPicPr>
+          <p:cNvPr id="28" name="Picture 27">
+            <a:extLst>
+              <a:ext uri="{FF2B5EF4-FFF2-40B4-BE49-F238E27FC236}">
+                <a16:creationId xmlns:a16="http://schemas.microsoft.com/office/drawing/2014/main" id="{A911B409-BBBE-F327-952E-5A07FFF30FD6}"/>
+              </a:ext>
+            </a:extLst>
+          </p:cNvPr>
+          <p:cNvPicPr>
+            <a:picLocks noChangeAspect="1"/>
+          </p:cNvPicPr>
+          <p:nvPr/>
+        </p:nvPicPr>
+        <p:blipFill>
+          <a:blip r:embed="rId19"/>
+          <a:stretch>
+            <a:fillRect/>
+          </a:stretch>
+        </p:blipFill>
+        <p:spPr>
+          <a:xfrm>
+            <a:off x="17596072" y="26675114"/>
+            <a:ext cx="13963219" cy="4452378"/>
+          </a:xfrm>
+          <a:prstGeom prst="rect">
+            <a:avLst/>
+          </a:prstGeom>
+        </p:spPr>
+      </p:pic>
+      <p:pic>
+        <p:nvPicPr>
+          <p:cNvPr id="40" name="Picture 39">
+            <a:extLst>
+              <a:ext uri="{FF2B5EF4-FFF2-40B4-BE49-F238E27FC236}">
+                <a16:creationId xmlns:a16="http://schemas.microsoft.com/office/drawing/2014/main" id="{0190C16A-2B59-07D9-7DE1-2D05831916C0}"/>
+              </a:ext>
+            </a:extLst>
+          </p:cNvPr>
+          <p:cNvPicPr>
+            <a:picLocks noChangeAspect="1"/>
+          </p:cNvPicPr>
+          <p:nvPr/>
+        </p:nvPicPr>
+        <p:blipFill>
+          <a:blip r:embed="rId20"/>
+          <a:stretch>
+            <a:fillRect/>
+          </a:stretch>
+        </p:blipFill>
+        <p:spPr>
+          <a:xfrm>
+            <a:off x="17596072" y="31909646"/>
+            <a:ext cx="13963219" cy="3780187"/>
+          </a:xfrm>
+          <a:prstGeom prst="rect">
+            <a:avLst/>
+          </a:prstGeom>
+        </p:spPr>
+      </p:pic>
+      <p:pic>
+        <p:nvPicPr>
+          <p:cNvPr id="47" name="Picture 46" descr="A picture containing font, graphics, logo, graphic design&#10;&#10;Description automatically generated">
+            <a:extLst>
+              <a:ext uri="{FF2B5EF4-FFF2-40B4-BE49-F238E27FC236}">
+                <a16:creationId xmlns:a16="http://schemas.microsoft.com/office/drawing/2014/main" id="{51EC36C8-9F8F-7AD4-46B0-B0889F7E0194}"/>
+              </a:ext>
+            </a:extLst>
+          </p:cNvPr>
+          <p:cNvPicPr>
+            <a:picLocks noChangeAspect="1"/>
+          </p:cNvPicPr>
+          <p:nvPr/>
+        </p:nvPicPr>
+        <p:blipFill>
+          <a:blip r:embed="rId21">
             <a:extLst>
               <a:ext uri="{28A0092B-C50C-407E-A947-70E740481C1C}">
                 <a14:useLocalDpi xmlns:a14="http://schemas.microsoft.com/office/drawing/2010/main" val="0"/>
@@ -6410,8 +6388,8 @@
         </p:blipFill>
         <p:spPr>
           <a:xfrm>
-            <a:off x="21809685" y="39291718"/>
-            <a:ext cx="5535992" cy="3423574"/>
+            <a:off x="25995775" y="41448820"/>
+            <a:ext cx="6579725" cy="1872279"/>
           </a:xfrm>
           <a:prstGeom prst="rect">
             <a:avLst/>

</xml_diff>